<commit_message>
updated instructor names and  title fonts
</commit_message>
<xml_diff>
--- a/Slides/Module 04 Interaction-Level Design Patterns.pptx
+++ b/Slides/Module 04 Interaction-Level Design Patterns.pptx
@@ -576,6 +576,61 @@
             <ac:spMk id="3" creationId="{6807ABB3-400B-5377-8373-242196443552}"/>
           </ac:spMkLst>
         </pc:spChg>
+      </pc:sldChg>
+    </pc:docChg>
+  </pc:docChgLst>
+  <pc:docChgLst>
+    <pc:chgData name="Mitchell Wand" userId="de9b44c55c049659" providerId="LiveId" clId="{FD479DE8-776B-41E8-8926-09AF8891AAED}"/>
+    <pc:docChg chg="custSel modSld">
+      <pc:chgData name="Mitchell Wand" userId="de9b44c55c049659" providerId="LiveId" clId="{FD479DE8-776B-41E8-8926-09AF8891AAED}" dt="2022-09-14T00:02:04.740" v="405" actId="20577"/>
+      <pc:docMkLst>
+        <pc:docMk/>
+      </pc:docMkLst>
+      <pc:sldChg chg="modNotesTx">
+        <pc:chgData name="Mitchell Wand" userId="de9b44c55c049659" providerId="LiveId" clId="{FD479DE8-776B-41E8-8926-09AF8891AAED}" dt="2022-09-14T00:02:04.740" v="405" actId="20577"/>
+        <pc:sldMkLst>
+          <pc:docMk/>
+          <pc:sldMk cId="4189392190" sldId="433"/>
+        </pc:sldMkLst>
+      </pc:sldChg>
+      <pc:sldChg chg="addSp delSp modSp mod delAnim modAnim modNotesTx">
+        <pc:chgData name="Mitchell Wand" userId="de9b44c55c049659" providerId="LiveId" clId="{FD479DE8-776B-41E8-8926-09AF8891AAED}" dt="2022-09-14T00:00:27.186" v="402" actId="20577"/>
+        <pc:sldMkLst>
+          <pc:docMk/>
+          <pc:sldMk cId="2830599574" sldId="495"/>
+        </pc:sldMkLst>
+        <pc:spChg chg="mod">
+          <ac:chgData name="Mitchell Wand" userId="de9b44c55c049659" providerId="LiveId" clId="{FD479DE8-776B-41E8-8926-09AF8891AAED}" dt="2022-09-13T23:53:10.682" v="37" actId="20577"/>
+          <ac:spMkLst>
+            <pc:docMk/>
+            <pc:sldMk cId="2830599574" sldId="495"/>
+            <ac:spMk id="2" creationId="{49C7D202-F4A0-317D-D8A6-DA68CE35CDA1}"/>
+          </ac:spMkLst>
+        </pc:spChg>
+        <pc:picChg chg="add del mod">
+          <ac:chgData name="Mitchell Wand" userId="de9b44c55c049659" providerId="LiveId" clId="{FD479DE8-776B-41E8-8926-09AF8891AAED}" dt="2022-09-13T23:57:53.148" v="260"/>
+          <ac:picMkLst>
+            <pc:docMk/>
+            <pc:sldMk cId="2830599574" sldId="495"/>
+            <ac:picMk id="3" creationId="{AD78F76B-6B4A-7239-6AE9-2340935A7400}"/>
+          </ac:picMkLst>
+        </pc:picChg>
+        <pc:picChg chg="del">
+          <ac:chgData name="Mitchell Wand" userId="de9b44c55c049659" providerId="LiveId" clId="{FD479DE8-776B-41E8-8926-09AF8891AAED}" dt="2022-09-13T23:57:47.726" v="258" actId="21"/>
+          <ac:picMkLst>
+            <pc:docMk/>
+            <pc:sldMk cId="2830599574" sldId="495"/>
+            <ac:picMk id="5" creationId="{9FB20D5C-DF6F-A9CB-FE64-CBAD7FA9A1F7}"/>
+          </ac:picMkLst>
+        </pc:picChg>
+        <pc:picChg chg="add mod">
+          <ac:chgData name="Mitchell Wand" userId="de9b44c55c049659" providerId="LiveId" clId="{FD479DE8-776B-41E8-8926-09AF8891AAED}" dt="2022-09-13T23:58:43.208" v="264" actId="1076"/>
+          <ac:picMkLst>
+            <pc:docMk/>
+            <pc:sldMk cId="2830599574" sldId="495"/>
+            <ac:picMk id="7" creationId="{FBFF9F06-9915-E65A-72F0-B1C57D7B1F81}"/>
+          </ac:picMkLst>
+        </pc:picChg>
       </pc:sldChg>
     </pc:docChg>
   </pc:docChgLst>
@@ -1581,61 +1636,6 @@
       </pc:sldChg>
     </pc:docChg>
   </pc:docChgLst>
-  <pc:docChgLst>
-    <pc:chgData name="Mitchell Wand" userId="de9b44c55c049659" providerId="LiveId" clId="{FD479DE8-776B-41E8-8926-09AF8891AAED}"/>
-    <pc:docChg chg="custSel modSld">
-      <pc:chgData name="Mitchell Wand" userId="de9b44c55c049659" providerId="LiveId" clId="{FD479DE8-776B-41E8-8926-09AF8891AAED}" dt="2022-09-14T00:02:04.740" v="405" actId="20577"/>
-      <pc:docMkLst>
-        <pc:docMk/>
-      </pc:docMkLst>
-      <pc:sldChg chg="modNotesTx">
-        <pc:chgData name="Mitchell Wand" userId="de9b44c55c049659" providerId="LiveId" clId="{FD479DE8-776B-41E8-8926-09AF8891AAED}" dt="2022-09-14T00:02:04.740" v="405" actId="20577"/>
-        <pc:sldMkLst>
-          <pc:docMk/>
-          <pc:sldMk cId="4189392190" sldId="433"/>
-        </pc:sldMkLst>
-      </pc:sldChg>
-      <pc:sldChg chg="addSp delSp modSp mod delAnim modAnim modNotesTx">
-        <pc:chgData name="Mitchell Wand" userId="de9b44c55c049659" providerId="LiveId" clId="{FD479DE8-776B-41E8-8926-09AF8891AAED}" dt="2022-09-14T00:00:27.186" v="402" actId="20577"/>
-        <pc:sldMkLst>
-          <pc:docMk/>
-          <pc:sldMk cId="2830599574" sldId="495"/>
-        </pc:sldMkLst>
-        <pc:spChg chg="mod">
-          <ac:chgData name="Mitchell Wand" userId="de9b44c55c049659" providerId="LiveId" clId="{FD479DE8-776B-41E8-8926-09AF8891AAED}" dt="2022-09-13T23:53:10.682" v="37" actId="20577"/>
-          <ac:spMkLst>
-            <pc:docMk/>
-            <pc:sldMk cId="2830599574" sldId="495"/>
-            <ac:spMk id="2" creationId="{49C7D202-F4A0-317D-D8A6-DA68CE35CDA1}"/>
-          </ac:spMkLst>
-        </pc:spChg>
-        <pc:picChg chg="add del mod">
-          <ac:chgData name="Mitchell Wand" userId="de9b44c55c049659" providerId="LiveId" clId="{FD479DE8-776B-41E8-8926-09AF8891AAED}" dt="2022-09-13T23:57:53.148" v="260"/>
-          <ac:picMkLst>
-            <pc:docMk/>
-            <pc:sldMk cId="2830599574" sldId="495"/>
-            <ac:picMk id="3" creationId="{AD78F76B-6B4A-7239-6AE9-2340935A7400}"/>
-          </ac:picMkLst>
-        </pc:picChg>
-        <pc:picChg chg="del">
-          <ac:chgData name="Mitchell Wand" userId="de9b44c55c049659" providerId="LiveId" clId="{FD479DE8-776B-41E8-8926-09AF8891AAED}" dt="2022-09-13T23:57:47.726" v="258" actId="21"/>
-          <ac:picMkLst>
-            <pc:docMk/>
-            <pc:sldMk cId="2830599574" sldId="495"/>
-            <ac:picMk id="5" creationId="{9FB20D5C-DF6F-A9CB-FE64-CBAD7FA9A1F7}"/>
-          </ac:picMkLst>
-        </pc:picChg>
-        <pc:picChg chg="add mod">
-          <ac:chgData name="Mitchell Wand" userId="de9b44c55c049659" providerId="LiveId" clId="{FD479DE8-776B-41E8-8926-09AF8891AAED}" dt="2022-09-13T23:58:43.208" v="264" actId="1076"/>
-          <ac:picMkLst>
-            <pc:docMk/>
-            <pc:sldMk cId="2830599574" sldId="495"/>
-            <ac:picMk id="7" creationId="{FBFF9F06-9915-E65A-72F0-B1C57D7B1F81}"/>
-          </ac:picMkLst>
-        </pc:picChg>
-      </pc:sldChg>
-    </pc:docChg>
-  </pc:docChgLst>
 </pc:chgInfo>
 </file>
 
@@ -1721,7 +1721,7 @@
           <a:p>
             <a:fld id="{7C7E5181-6CF5-45F7-A87A-E0E0B1FD7549}" type="datetimeFigureOut">
               <a:rPr lang="en-US" smtClean="0"/>
-              <a:t>1/12/2023</a:t>
+              <a:t>1/18/2023</a:t>
             </a:fld>
             <a:endParaRPr lang="en-US"/>
           </a:p>
@@ -5780,7 +5780,7 @@
           <a:p>
             <a:fld id="{5D2A64DE-480B-420F-9649-4F8E696E08E0}" type="datetime1">
               <a:rPr lang="en-US" smtClean="0"/>
-              <a:t>1/12/2023</a:t>
+              <a:t>1/18/2023</a:t>
             </a:fld>
             <a:endParaRPr lang="en-US"/>
           </a:p>
@@ -6104,7 +6104,7 @@
           <a:p>
             <a:fld id="{EA476A42-A091-4468-A075-64A31BE59948}" type="datetime1">
               <a:rPr lang="en-US" smtClean="0"/>
-              <a:t>1/12/2023</a:t>
+              <a:t>1/18/2023</a:t>
             </a:fld>
             <a:endParaRPr lang="en-US"/>
           </a:p>
@@ -6302,7 +6302,7 @@
           <a:p>
             <a:fld id="{0D3616D0-8311-4107-9726-6B805E7D05BA}" type="datetime1">
               <a:rPr lang="en-US" smtClean="0"/>
-              <a:t>1/12/2023</a:t>
+              <a:t>1/18/2023</a:t>
             </a:fld>
             <a:endParaRPr lang="en-US"/>
           </a:p>
@@ -6510,7 +6510,7 @@
           <a:p>
             <a:fld id="{3BC2557A-5C88-417A-A763-5AC779462A5F}" type="datetime1">
               <a:rPr lang="en-US" smtClean="0"/>
-              <a:t>1/12/2023</a:t>
+              <a:t>1/18/2023</a:t>
             </a:fld>
             <a:endParaRPr lang="en-US"/>
           </a:p>
@@ -7034,7 +7034,7 @@
           <a:p>
             <a:fld id="{07C7BFD4-467E-4EDE-93EA-052F5B39A4E5}" type="datetime1">
               <a:rPr lang="en-US" smtClean="0"/>
-              <a:t>1/12/2023</a:t>
+              <a:t>1/18/2023</a:t>
             </a:fld>
             <a:endParaRPr lang="en-US"/>
           </a:p>
@@ -7284,7 +7284,7 @@
           <a:p>
             <a:fld id="{07C7BFD4-467E-4EDE-93EA-052F5B39A4E5}" type="datetime1">
               <a:rPr lang="en-US" smtClean="0"/>
-              <a:t>1/12/2023</a:t>
+              <a:t>1/18/2023</a:t>
             </a:fld>
             <a:endParaRPr lang="en-US"/>
           </a:p>
@@ -7466,7 +7466,7 @@
           <a:p>
             <a:fld id="{109E55A0-C911-4F03-82FC-7E5926047D46}" type="datetime1">
               <a:rPr lang="en-US" smtClean="0"/>
-              <a:t>1/12/2023</a:t>
+              <a:t>1/18/2023</a:t>
             </a:fld>
             <a:endParaRPr lang="en-US"/>
           </a:p>
@@ -7779,7 +7779,7 @@
           <a:p>
             <a:fld id="{A533CBE2-D5BE-47AC-ADC2-9CDFC1D0CF90}" type="datetime1">
               <a:rPr lang="en-US" smtClean="0"/>
-              <a:t>1/12/2023</a:t>
+              <a:t>1/18/2023</a:t>
             </a:fld>
             <a:endParaRPr lang="en-US"/>
           </a:p>
@@ -8080,7 +8080,7 @@
           <a:p>
             <a:fld id="{39B7EDB1-CE74-4951-85A2-0B01C2128E28}" type="datetime1">
               <a:rPr lang="en-US" smtClean="0"/>
-              <a:t>1/12/2023</a:t>
+              <a:t>1/18/2023</a:t>
             </a:fld>
             <a:endParaRPr lang="en-US"/>
           </a:p>
@@ -8528,7 +8528,7 @@
           <a:p>
             <a:fld id="{2BC7EB92-A5C2-4807-A9DC-9EDE6CBFB241}" type="datetime1">
               <a:rPr lang="en-US" smtClean="0"/>
-              <a:t>1/12/2023</a:t>
+              <a:t>1/18/2023</a:t>
             </a:fld>
             <a:endParaRPr lang="en-US"/>
           </a:p>
@@ -8641,7 +8641,7 @@
           <a:p>
             <a:fld id="{2B7B7EE0-7771-4CD5-9B2B-3550753A54A1}" type="datetime1">
               <a:rPr lang="en-US" smtClean="0"/>
-              <a:t>1/12/2023</a:t>
+              <a:t>1/18/2023</a:t>
             </a:fld>
             <a:endParaRPr lang="en-US"/>
           </a:p>
@@ -8952,7 +8952,7 @@
           <a:p>
             <a:fld id="{F8B318B3-0E87-4416-A9B8-D891968C2727}" type="datetime1">
               <a:rPr lang="en-US" smtClean="0"/>
-              <a:t>1/12/2023</a:t>
+              <a:t>1/18/2023</a:t>
             </a:fld>
             <a:endParaRPr lang="en-US"/>
           </a:p>
@@ -9193,7 +9193,7 @@
           <a:p>
             <a:fld id="{54D997E8-DDEE-43F1-8D9B-F8A1E11DE488}" type="datetime1">
               <a:rPr lang="en-US" smtClean="0"/>
-              <a:t>1/12/2023</a:t>
+              <a:t>1/18/2023</a:t>
             </a:fld>
             <a:endParaRPr lang="en-US"/>
           </a:p>
@@ -9697,15 +9697,7 @@
             </a:pPr>
             <a:r>
               <a:rPr lang="en-US" sz="2400" dirty="0"/>
-              <a:t>Jonathan Bell, Adeel </a:t>
-            </a:r>
-            <a:r>
-              <a:rPr lang="en-US" sz="2400" dirty="0" err="1"/>
-              <a:t>Bhutta</a:t>
-            </a:r>
-            <a:r>
-              <a:rPr lang="en-US" sz="2400" dirty="0"/>
-              <a:t>, Mitch Wand</a:t>
+              <a:t>Adeel Bhutta, Jan Vitek, Mitch Wand</a:t>
             </a:r>
           </a:p>
           <a:p>
@@ -9720,7 +9712,7 @@
             </a:r>
           </a:p>
           <a:p>
-            <a:endParaRPr lang="en-US" dirty="0"/>
+            <a:endParaRPr lang="en-US" sz="2400" dirty="0"/>
           </a:p>
         </p:txBody>
       </p:sp>
@@ -18500,11 +18492,13 @@
         </p:nvSpPr>
         <p:spPr/>
         <p:txBody>
-          <a:bodyPr/>
+          <a:bodyPr>
+            <a:normAutofit/>
+          </a:bodyPr>
           <a:lstStyle/>
           <a:p>
             <a:r>
-              <a:rPr lang="en-US" dirty="0"/>
+              <a:rPr lang="en-US" sz="3600" dirty="0"/>
               <a:t>Interface for a client</a:t>
             </a:r>
           </a:p>
@@ -19047,11 +19041,13 @@
         </p:nvSpPr>
         <p:spPr/>
         <p:txBody>
-          <a:bodyPr/>
+          <a:bodyPr>
+            <a:normAutofit/>
+          </a:bodyPr>
           <a:lstStyle/>
           <a:p>
             <a:r>
-              <a:rPr lang="en-US" dirty="0"/>
+              <a:rPr lang="en-US" sz="3600" dirty="0"/>
               <a:t>Interface for a clock listener</a:t>
             </a:r>
           </a:p>
@@ -19662,19 +19658,21 @@
         </p:nvSpPr>
         <p:spPr/>
         <p:txBody>
-          <a:bodyPr/>
+          <a:bodyPr>
+            <a:normAutofit/>
+          </a:bodyPr>
           <a:lstStyle/>
           <a:p>
             <a:r>
-              <a:rPr lang="en-US" dirty="0"/>
+              <a:rPr lang="en-US" sz="3600" dirty="0"/>
               <a:t>A </a:t>
             </a:r>
             <a:r>
-              <a:rPr lang="en-US" dirty="0" err="1"/>
+              <a:rPr lang="en-US" sz="3600" dirty="0" err="1"/>
               <a:t>PushingClock</a:t>
             </a:r>
             <a:r>
-              <a:rPr lang="en-US" dirty="0"/>
+              <a:rPr lang="en-US" sz="3600" dirty="0"/>
               <a:t> class</a:t>
             </a:r>
           </a:p>
@@ -28982,11 +28980,13 @@
         </p:nvSpPr>
         <p:spPr/>
         <p:txBody>
-          <a:bodyPr/>
+          <a:bodyPr>
+            <a:normAutofit/>
+          </a:bodyPr>
           <a:lstStyle/>
           <a:p>
             <a:r>
-              <a:rPr lang="en-US" dirty="0"/>
+              <a:rPr lang="en-US" sz="3600" dirty="0"/>
               <a:t>Discussing your design </a:t>
             </a:r>
           </a:p>
@@ -29202,11 +29202,13 @@
         </p:nvSpPr>
         <p:spPr/>
         <p:txBody>
-          <a:bodyPr/>
+          <a:bodyPr>
+            <a:normAutofit/>
+          </a:bodyPr>
           <a:lstStyle/>
           <a:p>
             <a:r>
-              <a:rPr lang="en-US" dirty="0"/>
+              <a:rPr lang="en-US" sz="3600" dirty="0"/>
               <a:t>Discussing your design (2) </a:t>
             </a:r>
           </a:p>
@@ -29433,11 +29435,13 @@
         </p:nvSpPr>
         <p:spPr/>
         <p:txBody>
-          <a:bodyPr/>
+          <a:bodyPr>
+            <a:normAutofit/>
+          </a:bodyPr>
           <a:lstStyle/>
           <a:p>
             <a:r>
-              <a:rPr lang="en-US" dirty="0"/>
+              <a:rPr lang="en-US" sz="3600" dirty="0"/>
               <a:t>The Discussion (3)</a:t>
             </a:r>
           </a:p>
@@ -29653,11 +29657,13 @@
         </p:nvSpPr>
         <p:spPr/>
         <p:txBody>
-          <a:bodyPr/>
+          <a:bodyPr>
+            <a:normAutofit/>
+          </a:bodyPr>
           <a:lstStyle/>
           <a:p>
             <a:r>
-              <a:rPr lang="en-US" dirty="0"/>
+              <a:rPr lang="en-US" sz="3600" dirty="0"/>
               <a:t>The Discussion (4)</a:t>
             </a:r>
           </a:p>
@@ -29944,8 +29950,12 @@
           <a:p>
             <a:pPr lvl="1"/>
             <a:r>
+              <a:rPr lang="en-US"/>
+              <a:t>Give 3 </a:t>
+            </a:r>
+            <a:r>
               <a:rPr lang="en-US" dirty="0"/>
-              <a:t>Give 4 examples of interaction patterns and describe their distinguishing characteristics</a:t>
+              <a:t>examples of interaction patterns and describe their distinguishing characteristics</a:t>
             </a:r>
           </a:p>
           <a:p>

</xml_diff>

<commit_message>
renamed files and updated to 2023 dates
</commit_message>
<xml_diff>
--- a/Slides/Module 04 Interaction-Level Design Patterns.pptx
+++ b/Slides/Module 04 Interaction-Level Design Patterns.pptx
@@ -1721,7 +1721,7 @@
           <a:p>
             <a:fld id="{7C7E5181-6CF5-45F7-A87A-E0E0B1FD7549}" type="datetimeFigureOut">
               <a:rPr lang="en-US" smtClean="0"/>
-              <a:t>1/18/2023</a:t>
+              <a:t>1/24/2023</a:t>
             </a:fld>
             <a:endParaRPr lang="en-US"/>
           </a:p>
@@ -5780,7 +5780,7 @@
           <a:p>
             <a:fld id="{5D2A64DE-480B-420F-9649-4F8E696E08E0}" type="datetime1">
               <a:rPr lang="en-US" smtClean="0"/>
-              <a:t>1/18/2023</a:t>
+              <a:t>1/24/2023</a:t>
             </a:fld>
             <a:endParaRPr lang="en-US"/>
           </a:p>
@@ -6104,7 +6104,7 @@
           <a:p>
             <a:fld id="{EA476A42-A091-4468-A075-64A31BE59948}" type="datetime1">
               <a:rPr lang="en-US" smtClean="0"/>
-              <a:t>1/18/2023</a:t>
+              <a:t>1/24/2023</a:t>
             </a:fld>
             <a:endParaRPr lang="en-US"/>
           </a:p>
@@ -6302,7 +6302,7 @@
           <a:p>
             <a:fld id="{0D3616D0-8311-4107-9726-6B805E7D05BA}" type="datetime1">
               <a:rPr lang="en-US" smtClean="0"/>
-              <a:t>1/18/2023</a:t>
+              <a:t>1/24/2023</a:t>
             </a:fld>
             <a:endParaRPr lang="en-US"/>
           </a:p>
@@ -6510,7 +6510,7 @@
           <a:p>
             <a:fld id="{3BC2557A-5C88-417A-A763-5AC779462A5F}" type="datetime1">
               <a:rPr lang="en-US" smtClean="0"/>
-              <a:t>1/18/2023</a:t>
+              <a:t>1/24/2023</a:t>
             </a:fld>
             <a:endParaRPr lang="en-US"/>
           </a:p>
@@ -7034,7 +7034,7 @@
           <a:p>
             <a:fld id="{07C7BFD4-467E-4EDE-93EA-052F5B39A4E5}" type="datetime1">
               <a:rPr lang="en-US" smtClean="0"/>
-              <a:t>1/18/2023</a:t>
+              <a:t>1/24/2023</a:t>
             </a:fld>
             <a:endParaRPr lang="en-US"/>
           </a:p>
@@ -7284,7 +7284,7 @@
           <a:p>
             <a:fld id="{07C7BFD4-467E-4EDE-93EA-052F5B39A4E5}" type="datetime1">
               <a:rPr lang="en-US" smtClean="0"/>
-              <a:t>1/18/2023</a:t>
+              <a:t>1/24/2023</a:t>
             </a:fld>
             <a:endParaRPr lang="en-US"/>
           </a:p>
@@ -7466,7 +7466,7 @@
           <a:p>
             <a:fld id="{109E55A0-C911-4F03-82FC-7E5926047D46}" type="datetime1">
               <a:rPr lang="en-US" smtClean="0"/>
-              <a:t>1/18/2023</a:t>
+              <a:t>1/24/2023</a:t>
             </a:fld>
             <a:endParaRPr lang="en-US"/>
           </a:p>
@@ -7779,7 +7779,7 @@
           <a:p>
             <a:fld id="{A533CBE2-D5BE-47AC-ADC2-9CDFC1D0CF90}" type="datetime1">
               <a:rPr lang="en-US" smtClean="0"/>
-              <a:t>1/18/2023</a:t>
+              <a:t>1/24/2023</a:t>
             </a:fld>
             <a:endParaRPr lang="en-US"/>
           </a:p>
@@ -8080,7 +8080,7 @@
           <a:p>
             <a:fld id="{39B7EDB1-CE74-4951-85A2-0B01C2128E28}" type="datetime1">
               <a:rPr lang="en-US" smtClean="0"/>
-              <a:t>1/18/2023</a:t>
+              <a:t>1/24/2023</a:t>
             </a:fld>
             <a:endParaRPr lang="en-US"/>
           </a:p>
@@ -8528,7 +8528,7 @@
           <a:p>
             <a:fld id="{2BC7EB92-A5C2-4807-A9DC-9EDE6CBFB241}" type="datetime1">
               <a:rPr lang="en-US" smtClean="0"/>
-              <a:t>1/18/2023</a:t>
+              <a:t>1/24/2023</a:t>
             </a:fld>
             <a:endParaRPr lang="en-US"/>
           </a:p>
@@ -8641,7 +8641,7 @@
           <a:p>
             <a:fld id="{2B7B7EE0-7771-4CD5-9B2B-3550753A54A1}" type="datetime1">
               <a:rPr lang="en-US" smtClean="0"/>
-              <a:t>1/18/2023</a:t>
+              <a:t>1/24/2023</a:t>
             </a:fld>
             <a:endParaRPr lang="en-US"/>
           </a:p>
@@ -8952,7 +8952,7 @@
           <a:p>
             <a:fld id="{F8B318B3-0E87-4416-A9B8-D891968C2727}" type="datetime1">
               <a:rPr lang="en-US" smtClean="0"/>
-              <a:t>1/18/2023</a:t>
+              <a:t>1/24/2023</a:t>
             </a:fld>
             <a:endParaRPr lang="en-US"/>
           </a:p>
@@ -9193,7 +9193,7 @@
           <a:p>
             <a:fld id="{54D997E8-DDEE-43F1-8D9B-F8A1E11DE488}" type="datetime1">
               <a:rPr lang="en-US" smtClean="0"/>
-              <a:t>1/18/2023</a:t>
+              <a:t>1/24/2023</a:t>
             </a:fld>
             <a:endParaRPr lang="en-US"/>
           </a:p>
@@ -9774,12 +9774,20 @@
           <a:lstStyle/>
           <a:p>
             <a:r>
+              <a:rPr lang="en-US">
+                <a:solidFill>
+                  <a:srgbClr val="5C5962"/>
+                </a:solidFill>
+              </a:rPr>
+              <a:t>© 2023 </a:t>
+            </a:r>
+            <a:r>
               <a:rPr lang="en-US" dirty="0">
                 <a:solidFill>
                   <a:srgbClr val="5C5962"/>
                 </a:solidFill>
               </a:rPr>
-              <a:t>© 2022 Released under the </a:t>
+              <a:t>Released under the </a:t>
             </a:r>
             <a:r>
               <a:rPr lang="en-US" dirty="0">

</xml_diff>